<commit_message>
Adding check for Global Catalog
</commit_message>
<xml_diff>
--- a/docs/images/architecture_diagram.pptx
+++ b/docs/images/architecture_diagram.pptx
@@ -325,7 +325,7 @@
               <a:pPr>
                 <a:defRPr/>
               </a:pPr>
-              <a:t>4/5/21</a:t>
+              <a:t>4/22/21</a:t>
             </a:fld>
             <a:endParaRPr lang="en-US" dirty="0"/>
           </a:p>
@@ -18586,64 +18586,6 @@
           </a:p>
         </p:txBody>
       </p:sp>
-      <p:pic>
-        <p:nvPicPr>
-          <p:cNvPr id="101" name="Graphic 56">
-            <a:extLst>
-              <a:ext uri="{FF2B5EF4-FFF2-40B4-BE49-F238E27FC236}">
-                <a16:creationId xmlns:a16="http://schemas.microsoft.com/office/drawing/2014/main" id="{9CEF8F38-1253-FD42-8D6F-87AB58CF8370}"/>
-              </a:ext>
-            </a:extLst>
-          </p:cNvPr>
-          <p:cNvPicPr>
-            <a:picLocks noChangeAspect="1" noChangeArrowheads="1"/>
-          </p:cNvPicPr>
-          <p:nvPr/>
-        </p:nvPicPr>
-        <p:blipFill>
-          <a:blip r:embed="rId17">
-            <a:extLst>
-              <a:ext uri="{96DAC541-7B7A-43D3-8B79-37D633B846F1}">
-                <asvg:svgBlip xmlns:asvg="http://schemas.microsoft.com/office/drawing/2016/SVG/main" r:embed="rId18"/>
-              </a:ext>
-            </a:extLst>
-          </a:blip>
-          <a:srcRect/>
-          <a:stretch/>
-        </p:blipFill>
-        <p:spPr bwMode="auto">
-          <a:xfrm>
-            <a:off x="5935219" y="2689491"/>
-            <a:ext cx="457200" cy="457200"/>
-          </a:xfrm>
-          <a:prstGeom prst="rect">
-            <a:avLst/>
-          </a:prstGeom>
-          <a:noFill/>
-          <a:ln>
-            <a:noFill/>
-          </a:ln>
-          <a:extLst>
-            <a:ext uri="{909E8E84-426E-40DD-AFC4-6F175D3DCCD1}">
-              <a14:hiddenFill xmlns:a14="http://schemas.microsoft.com/office/drawing/2010/main">
-                <a:solidFill>
-                  <a:srgbClr val="FFFFFF"/>
-                </a:solidFill>
-              </a14:hiddenFill>
-            </a:ext>
-            <a:ext uri="{91240B29-F687-4F45-9708-019B960494DF}">
-              <a14:hiddenLine xmlns:a14="http://schemas.microsoft.com/office/drawing/2010/main" w="9525">
-                <a:solidFill>
-                  <a:srgbClr val="000000"/>
-                </a:solidFill>
-                <a:miter lim="800000"/>
-                <a:headEnd/>
-                <a:tailEnd/>
-              </a14:hiddenLine>
-            </a:ext>
-          </a:extLst>
-        </p:spPr>
-      </p:pic>
       <p:sp>
         <p:nvSpPr>
           <p:cNvPr id="102" name="TextBox 16">
@@ -20224,6 +20166,64 @@
           </a:fontRef>
         </p:style>
       </p:cxnSp>
+      <p:pic>
+        <p:nvPicPr>
+          <p:cNvPr id="68" name="Graphic 108">
+            <a:extLst>
+              <a:ext uri="{FF2B5EF4-FFF2-40B4-BE49-F238E27FC236}">
+                <a16:creationId xmlns:a16="http://schemas.microsoft.com/office/drawing/2014/main" id="{A735B4B1-A864-4C4F-A6D5-C111BB1F9976}"/>
+              </a:ext>
+            </a:extLst>
+          </p:cNvPr>
+          <p:cNvPicPr>
+            <a:picLocks noChangeAspect="1" noChangeArrowheads="1"/>
+          </p:cNvPicPr>
+          <p:nvPr/>
+        </p:nvPicPr>
+        <p:blipFill>
+          <a:blip r:embed="rId30">
+            <a:extLst>
+              <a:ext uri="{96DAC541-7B7A-43D3-8B79-37D633B846F1}">
+                <asvg:svgBlip xmlns:asvg="http://schemas.microsoft.com/office/drawing/2016/SVG/main" r:embed="rId31"/>
+              </a:ext>
+            </a:extLst>
+          </a:blip>
+          <a:srcRect/>
+          <a:stretch/>
+        </p:blipFill>
+        <p:spPr bwMode="auto">
+          <a:xfrm>
+            <a:off x="5935254" y="2736599"/>
+            <a:ext cx="457200" cy="457200"/>
+          </a:xfrm>
+          <a:prstGeom prst="rect">
+            <a:avLst/>
+          </a:prstGeom>
+          <a:noFill/>
+          <a:ln>
+            <a:noFill/>
+          </a:ln>
+          <a:extLst>
+            <a:ext uri="{909E8E84-426E-40DD-AFC4-6F175D3DCCD1}">
+              <a14:hiddenFill xmlns:a14="http://schemas.microsoft.com/office/drawing/2010/main">
+                <a:solidFill>
+                  <a:srgbClr val="FFFFFF"/>
+                </a:solidFill>
+              </a14:hiddenFill>
+            </a:ext>
+            <a:ext uri="{91240B29-F687-4F45-9708-019B960494DF}">
+              <a14:hiddenLine xmlns:a14="http://schemas.microsoft.com/office/drawing/2010/main" w="9525">
+                <a:solidFill>
+                  <a:srgbClr val="000000"/>
+                </a:solidFill>
+                <a:miter lim="800000"/>
+                <a:headEnd/>
+                <a:tailEnd/>
+              </a14:hiddenLine>
+            </a:ext>
+          </a:extLst>
+        </p:spPr>
+      </p:pic>
     </p:spTree>
     <p:extLst>
       <p:ext uri="{BB962C8B-B14F-4D97-AF65-F5344CB8AC3E}">

</xml_diff>